<commit_message>
Docs Folder - fix
</commit_message>
<xml_diff>
--- a/Docs/Dev_Guide.pptx
+++ b/Docs/Dev_Guide.pptx
@@ -6934,11 +6934,18 @@
               <a:t>이 때 </a:t>
             </a:r>
             <a:r>
+              <a:rPr lang="en-US" altLang="ko-KR" sz="1400">
+                <a:latin typeface="나눔바른고딕" panose="020B0603020101020101" pitchFamily="50" charset="-127"/>
+                <a:ea typeface="나눔바른고딕" panose="020B0603020101020101" pitchFamily="50" charset="-127"/>
+              </a:rPr>
+              <a:t>seeds.</a:t>
+            </a:r>
+            <a:r>
               <a:rPr lang="en-US" altLang="ko-KR" sz="1400" dirty="0" err="1">
                 <a:latin typeface="나눔바른고딕" panose="020B0603020101020101" pitchFamily="50" charset="-127"/>
                 <a:ea typeface="나눔바른고딕" panose="020B0603020101020101" pitchFamily="50" charset="-127"/>
               </a:rPr>
-              <a:t>seed.rb</a:t>
+              <a:t>rb</a:t>
             </a:r>
             <a:r>
               <a:rPr lang="ko-KR" altLang="en-US" sz="1400" dirty="0">

</xml_diff>